<commit_message>
Update New Microsoft PowerPoint Presentation.pptx
</commit_message>
<xml_diff>
--- a/New Microsoft PowerPoint Presentation.pptx
+++ b/New Microsoft PowerPoint Presentation.pptx
@@ -114,6 +114,11 @@
       </a:defRPr>
     </a:lvl9pPr>
   </p:defaultTextStyle>
+  <p:extLst>
+    <p:ext uri="{EFAFB233-063F-42B5-8137-9DF3F51BA10A}">
+      <p15:sldGuideLst xmlns:p15="http://schemas.microsoft.com/office/powerpoint/2012/main"/>
+    </p:ext>
+  </p:extLst>
 </p:presentation>
 </file>
 
@@ -404,7 +409,7 @@
           <a:p>
             <a:fld id="{2B133695-E7FB-4473-8013-424BE9397C6C}" type="datetimeFigureOut">
               <a:rPr lang="en-US" smtClean="0"/>
-              <a:t>5/24/2022</a:t>
+              <a:t>5/26/2022</a:t>
             </a:fld>
             <a:endParaRPr lang="en-US"/>
           </a:p>
@@ -602,7 +607,7 @@
           <a:p>
             <a:fld id="{2B133695-E7FB-4473-8013-424BE9397C6C}" type="datetimeFigureOut">
               <a:rPr lang="en-US" smtClean="0"/>
-              <a:t>5/24/2022</a:t>
+              <a:t>5/26/2022</a:t>
             </a:fld>
             <a:endParaRPr lang="en-US"/>
           </a:p>
@@ -810,7 +815,7 @@
           <a:p>
             <a:fld id="{2B133695-E7FB-4473-8013-424BE9397C6C}" type="datetimeFigureOut">
               <a:rPr lang="en-US" smtClean="0"/>
-              <a:t>5/24/2022</a:t>
+              <a:t>5/26/2022</a:t>
             </a:fld>
             <a:endParaRPr lang="en-US"/>
           </a:p>
@@ -1008,7 +1013,7 @@
           <a:p>
             <a:fld id="{2B133695-E7FB-4473-8013-424BE9397C6C}" type="datetimeFigureOut">
               <a:rPr lang="en-US" smtClean="0"/>
-              <a:t>5/24/2022</a:t>
+              <a:t>5/26/2022</a:t>
             </a:fld>
             <a:endParaRPr lang="en-US"/>
           </a:p>
@@ -1283,7 +1288,7 @@
           <a:p>
             <a:fld id="{2B133695-E7FB-4473-8013-424BE9397C6C}" type="datetimeFigureOut">
               <a:rPr lang="en-US" smtClean="0"/>
-              <a:t>5/24/2022</a:t>
+              <a:t>5/26/2022</a:t>
             </a:fld>
             <a:endParaRPr lang="en-US"/>
           </a:p>
@@ -1548,7 +1553,7 @@
           <a:p>
             <a:fld id="{2B133695-E7FB-4473-8013-424BE9397C6C}" type="datetimeFigureOut">
               <a:rPr lang="en-US" smtClean="0"/>
-              <a:t>5/24/2022</a:t>
+              <a:t>5/26/2022</a:t>
             </a:fld>
             <a:endParaRPr lang="en-US"/>
           </a:p>
@@ -1960,7 +1965,7 @@
           <a:p>
             <a:fld id="{2B133695-E7FB-4473-8013-424BE9397C6C}" type="datetimeFigureOut">
               <a:rPr lang="en-US" smtClean="0"/>
-              <a:t>5/24/2022</a:t>
+              <a:t>5/26/2022</a:t>
             </a:fld>
             <a:endParaRPr lang="en-US"/>
           </a:p>
@@ -2101,7 +2106,7 @@
           <a:p>
             <a:fld id="{2B133695-E7FB-4473-8013-424BE9397C6C}" type="datetimeFigureOut">
               <a:rPr lang="en-US" smtClean="0"/>
-              <a:t>5/24/2022</a:t>
+              <a:t>5/26/2022</a:t>
             </a:fld>
             <a:endParaRPr lang="en-US"/>
           </a:p>
@@ -2214,7 +2219,7 @@
           <a:p>
             <a:fld id="{2B133695-E7FB-4473-8013-424BE9397C6C}" type="datetimeFigureOut">
               <a:rPr lang="en-US" smtClean="0"/>
-              <a:t>5/24/2022</a:t>
+              <a:t>5/26/2022</a:t>
             </a:fld>
             <a:endParaRPr lang="en-US"/>
           </a:p>
@@ -2525,7 +2530,7 @@
           <a:p>
             <a:fld id="{2B133695-E7FB-4473-8013-424BE9397C6C}" type="datetimeFigureOut">
               <a:rPr lang="en-US" smtClean="0"/>
-              <a:t>5/24/2022</a:t>
+              <a:t>5/26/2022</a:t>
             </a:fld>
             <a:endParaRPr lang="en-US"/>
           </a:p>
@@ -2813,7 +2818,7 @@
           <a:p>
             <a:fld id="{2B133695-E7FB-4473-8013-424BE9397C6C}" type="datetimeFigureOut">
               <a:rPr lang="en-US" smtClean="0"/>
-              <a:t>5/24/2022</a:t>
+              <a:t>5/26/2022</a:t>
             </a:fld>
             <a:endParaRPr lang="en-US"/>
           </a:p>
@@ -3054,7 +3059,7 @@
           <a:p>
             <a:fld id="{2B133695-E7FB-4473-8013-424BE9397C6C}" type="datetimeFigureOut">
               <a:rPr lang="en-US" smtClean="0"/>
-              <a:t>5/24/2022</a:t>
+              <a:t>5/26/2022</a:t>
             </a:fld>
             <a:endParaRPr lang="en-US"/>
           </a:p>
@@ -5179,6 +5184,102 @@
           </a:fontRef>
         </p:style>
       </p:cxnSp>
+      <p:sp>
+        <p:nvSpPr>
+          <p:cNvPr id="4" name="TextBox 3">
+            <a:extLst>
+              <a:ext uri="{FF2B5EF4-FFF2-40B4-BE49-F238E27FC236}">
+                <a16:creationId xmlns:a16="http://schemas.microsoft.com/office/drawing/2014/main" id="{5F151F43-4331-FDD3-B064-90CE61E5C9A1}"/>
+              </a:ext>
+            </a:extLst>
+          </p:cNvPr>
+          <p:cNvSpPr txBox="1"/>
+          <p:nvPr/>
+        </p:nvSpPr>
+        <p:spPr>
+          <a:xfrm>
+            <a:off x="1219200" y="5193708"/>
+            <a:ext cx="4163291" cy="738664"/>
+          </a:xfrm>
+          <a:prstGeom prst="rect">
+            <a:avLst/>
+          </a:prstGeom>
+          <a:noFill/>
+        </p:spPr>
+        <p:txBody>
+          <a:bodyPr wrap="square" rtlCol="0">
+            <a:spAutoFit/>
+          </a:bodyPr>
+          <a:lstStyle/>
+          <a:p>
+            <a:r>
+              <a:rPr lang="en-US" sz="1400" dirty="0">
+                <a:solidFill>
+                  <a:srgbClr val="FF0000"/>
+                </a:solidFill>
+              </a:rPr>
+              <a:t>If there is no data cleaning, the length of the matrix is different. According to the </a:t>
+            </a:r>
+            <a:r>
+              <a:rPr lang="en-US" altLang="zh-CN" sz="1400" dirty="0">
+                <a:solidFill>
+                  <a:srgbClr val="FF0000"/>
+                </a:solidFill>
+              </a:rPr>
+              <a:t>code applying this program</a:t>
+            </a:r>
+            <a:r>
+              <a:rPr lang="en-US" sz="1400" dirty="0">
+                <a:solidFill>
+                  <a:srgbClr val="FF0000"/>
+                </a:solidFill>
+              </a:rPr>
+              <a:t>, it will eventually fail to run.</a:t>
+            </a:r>
+          </a:p>
+        </p:txBody>
+      </p:sp>
+      <p:cxnSp>
+        <p:nvCxnSpPr>
+          <p:cNvPr id="10" name="Straight Arrow Connector 9">
+            <a:extLst>
+              <a:ext uri="{FF2B5EF4-FFF2-40B4-BE49-F238E27FC236}">
+                <a16:creationId xmlns:a16="http://schemas.microsoft.com/office/drawing/2014/main" id="{F7270B5D-4A30-86C9-5CDB-C15E83020517}"/>
+              </a:ext>
+            </a:extLst>
+          </p:cNvPr>
+          <p:cNvCxnSpPr>
+            <a:endCxn id="4" idx="3"/>
+          </p:cNvCxnSpPr>
+          <p:nvPr/>
+        </p:nvCxnSpPr>
+        <p:spPr>
+          <a:xfrm flipH="1">
+            <a:off x="5382491" y="5492544"/>
+            <a:ext cx="949036" cy="70496"/>
+          </a:xfrm>
+          <a:prstGeom prst="straightConnector1">
+            <a:avLst/>
+          </a:prstGeom>
+          <a:ln>
+            <a:tailEnd type="triangle"/>
+          </a:ln>
+        </p:spPr>
+        <p:style>
+          <a:lnRef idx="1">
+            <a:schemeClr val="accent1"/>
+          </a:lnRef>
+          <a:fillRef idx="0">
+            <a:schemeClr val="accent1"/>
+          </a:fillRef>
+          <a:effectRef idx="0">
+            <a:schemeClr val="accent1"/>
+          </a:effectRef>
+          <a:fontRef idx="minor">
+            <a:schemeClr val="tx1"/>
+          </a:fontRef>
+        </p:style>
+      </p:cxnSp>
     </p:spTree>
     <p:extLst>
       <p:ext uri="{BB962C8B-B14F-4D97-AF65-F5344CB8AC3E}">
@@ -6706,8 +6807,8 @@
           </a:xfrm>
         </p:spPr>
       </p:pic>
-      <mc:AlternateContent xmlns:mc="http://schemas.openxmlformats.org/markup-compatibility/2006">
-        <mc:Choice xmlns:p14="http://schemas.microsoft.com/office/powerpoint/2010/main" Requires="p14">
+      <mc:AlternateContent xmlns:mc="http://schemas.openxmlformats.org/markup-compatibility/2006" xmlns:p14="http://schemas.microsoft.com/office/powerpoint/2010/main">
+        <mc:Choice Requires="p14">
           <p:contentPart p14:bwMode="auto" r:id="rId3">
             <p14:nvContentPartPr>
               <p14:cNvPr id="7" name="Ink 6">
@@ -6726,7 +6827,7 @@
             </p14:xfrm>
           </p:contentPart>
         </mc:Choice>
-        <mc:Fallback>
+        <mc:Fallback xmlns="">
           <p:pic>
             <p:nvPicPr>
               <p:cNvPr id="7" name="Ink 6">
@@ -6757,8 +6858,8 @@
           </p:pic>
         </mc:Fallback>
       </mc:AlternateContent>
-      <mc:AlternateContent xmlns:mc="http://schemas.openxmlformats.org/markup-compatibility/2006">
-        <mc:Choice xmlns:p14="http://schemas.microsoft.com/office/powerpoint/2010/main" Requires="p14">
+      <mc:AlternateContent xmlns:mc="http://schemas.openxmlformats.org/markup-compatibility/2006" xmlns:p14="http://schemas.microsoft.com/office/powerpoint/2010/main">
+        <mc:Choice Requires="p14">
           <p:contentPart p14:bwMode="auto" r:id="rId5">
             <p14:nvContentPartPr>
               <p14:cNvPr id="10" name="Ink 9">
@@ -6777,7 +6878,7 @@
             </p14:xfrm>
           </p:contentPart>
         </mc:Choice>
-        <mc:Fallback>
+        <mc:Fallback xmlns="">
           <p:pic>
             <p:nvPicPr>
               <p:cNvPr id="10" name="Ink 9">
@@ -6808,8 +6909,8 @@
           </p:pic>
         </mc:Fallback>
       </mc:AlternateContent>
-      <mc:AlternateContent xmlns:mc="http://schemas.openxmlformats.org/markup-compatibility/2006">
-        <mc:Choice xmlns:p14="http://schemas.microsoft.com/office/powerpoint/2010/main" Requires="p14">
+      <mc:AlternateContent xmlns:mc="http://schemas.openxmlformats.org/markup-compatibility/2006" xmlns:p14="http://schemas.microsoft.com/office/powerpoint/2010/main">
+        <mc:Choice Requires="p14">
           <p:contentPart p14:bwMode="auto" r:id="rId7">
             <p14:nvContentPartPr>
               <p14:cNvPr id="11" name="Ink 10">
@@ -6828,7 +6929,7 @@
             </p14:xfrm>
           </p:contentPart>
         </mc:Choice>
-        <mc:Fallback>
+        <mc:Fallback xmlns="">
           <p:pic>
             <p:nvPicPr>
               <p:cNvPr id="11" name="Ink 10">
@@ -7022,8 +7123,8 @@
             <a:chExt cx="1245960" cy="329760"/>
           </a:xfrm>
         </p:grpSpPr>
-        <mc:AlternateContent xmlns:mc="http://schemas.openxmlformats.org/markup-compatibility/2006">
-          <mc:Choice xmlns:p14="http://schemas.microsoft.com/office/powerpoint/2010/main" Requires="p14">
+        <mc:AlternateContent xmlns:mc="http://schemas.openxmlformats.org/markup-compatibility/2006" xmlns:p14="http://schemas.microsoft.com/office/powerpoint/2010/main">
+          <mc:Choice Requires="p14">
             <p:contentPart p14:bwMode="auto" r:id="rId9">
               <p14:nvContentPartPr>
                 <p14:cNvPr id="20" name="Ink 19">
@@ -7042,7 +7143,7 @@
               </p14:xfrm>
             </p:contentPart>
           </mc:Choice>
-          <mc:Fallback>
+          <mc:Fallback xmlns="">
             <p:pic>
               <p:nvPicPr>
                 <p:cNvPr id="20" name="Ink 19">
@@ -7073,8 +7174,8 @@
             </p:pic>
           </mc:Fallback>
         </mc:AlternateContent>
-        <mc:AlternateContent xmlns:mc="http://schemas.openxmlformats.org/markup-compatibility/2006">
-          <mc:Choice xmlns:p14="http://schemas.microsoft.com/office/powerpoint/2010/main" Requires="p14">
+        <mc:AlternateContent xmlns:mc="http://schemas.openxmlformats.org/markup-compatibility/2006" xmlns:p14="http://schemas.microsoft.com/office/powerpoint/2010/main">
+          <mc:Choice Requires="p14">
             <p:contentPart p14:bwMode="auto" r:id="rId11">
               <p14:nvContentPartPr>
                 <p14:cNvPr id="21" name="Ink 20">
@@ -7093,7 +7194,7 @@
               </p14:xfrm>
             </p:contentPart>
           </mc:Choice>
-          <mc:Fallback>
+          <mc:Fallback xmlns="">
             <p:pic>
               <p:nvPicPr>
                 <p:cNvPr id="21" name="Ink 20">

</xml_diff>